<commit_message>
Added Jobs API Project
</commit_message>
<xml_diff>
--- a/src/assets/images.pptx
+++ b/src/assets/images.pptx
@@ -5,12 +5,13 @@
     <p:sldMasterId id="2147483648" r:id="rId1"/>
   </p:sldMasterIdLst>
   <p:notesMasterIdLst>
-    <p:notesMasterId r:id="rId5"/>
+    <p:notesMasterId r:id="rId6"/>
   </p:notesMasterIdLst>
   <p:sldIdLst>
     <p:sldId id="256" r:id="rId2"/>
     <p:sldId id="257" r:id="rId3"/>
     <p:sldId id="258" r:id="rId4"/>
+    <p:sldId id="259" r:id="rId5"/>
   </p:sldIdLst>
   <p:sldSz cx="12192000" cy="6858000"/>
   <p:notesSz cx="6858000" cy="9144000"/>
@@ -199,7 +200,7 @@
           <a:p>
             <a:fld id="{8CB943C2-E17A-4FA6-B36A-F774F8F90D3B}" type="datetimeFigureOut">
               <a:rPr lang="ru-RU" smtClean="0"/>
-              <a:t>13.09.2022</a:t>
+              <a:t>14.10.2022</a:t>
             </a:fld>
             <a:endParaRPr lang="ru-RU"/>
           </a:p>
@@ -682,7 +683,7 @@
           <a:p>
             <a:fld id="{DC4BD93D-3185-491E-B6C8-25388E42DC10}" type="datetimeFigureOut">
               <a:rPr lang="ru-RU" smtClean="0"/>
-              <a:t>13.09.2022</a:t>
+              <a:t>14.10.2022</a:t>
             </a:fld>
             <a:endParaRPr lang="ru-RU"/>
           </a:p>
@@ -852,7 +853,7 @@
           <a:p>
             <a:fld id="{DC4BD93D-3185-491E-B6C8-25388E42DC10}" type="datetimeFigureOut">
               <a:rPr lang="ru-RU" smtClean="0"/>
-              <a:t>13.09.2022</a:t>
+              <a:t>14.10.2022</a:t>
             </a:fld>
             <a:endParaRPr lang="ru-RU"/>
           </a:p>
@@ -1032,7 +1033,7 @@
           <a:p>
             <a:fld id="{DC4BD93D-3185-491E-B6C8-25388E42DC10}" type="datetimeFigureOut">
               <a:rPr lang="ru-RU" smtClean="0"/>
-              <a:t>13.09.2022</a:t>
+              <a:t>14.10.2022</a:t>
             </a:fld>
             <a:endParaRPr lang="ru-RU"/>
           </a:p>
@@ -1202,7 +1203,7 @@
           <a:p>
             <a:fld id="{DC4BD93D-3185-491E-B6C8-25388E42DC10}" type="datetimeFigureOut">
               <a:rPr lang="ru-RU" smtClean="0"/>
-              <a:t>13.09.2022</a:t>
+              <a:t>14.10.2022</a:t>
             </a:fld>
             <a:endParaRPr lang="ru-RU"/>
           </a:p>
@@ -1448,7 +1449,7 @@
           <a:p>
             <a:fld id="{DC4BD93D-3185-491E-B6C8-25388E42DC10}" type="datetimeFigureOut">
               <a:rPr lang="ru-RU" smtClean="0"/>
-              <a:t>13.09.2022</a:t>
+              <a:t>14.10.2022</a:t>
             </a:fld>
             <a:endParaRPr lang="ru-RU"/>
           </a:p>
@@ -1680,7 +1681,7 @@
           <a:p>
             <a:fld id="{DC4BD93D-3185-491E-B6C8-25388E42DC10}" type="datetimeFigureOut">
               <a:rPr lang="ru-RU" smtClean="0"/>
-              <a:t>13.09.2022</a:t>
+              <a:t>14.10.2022</a:t>
             </a:fld>
             <a:endParaRPr lang="ru-RU"/>
           </a:p>
@@ -2047,7 +2048,7 @@
           <a:p>
             <a:fld id="{DC4BD93D-3185-491E-B6C8-25388E42DC10}" type="datetimeFigureOut">
               <a:rPr lang="ru-RU" smtClean="0"/>
-              <a:t>13.09.2022</a:t>
+              <a:t>14.10.2022</a:t>
             </a:fld>
             <a:endParaRPr lang="ru-RU"/>
           </a:p>
@@ -2165,7 +2166,7 @@
           <a:p>
             <a:fld id="{DC4BD93D-3185-491E-B6C8-25388E42DC10}" type="datetimeFigureOut">
               <a:rPr lang="ru-RU" smtClean="0"/>
-              <a:t>13.09.2022</a:t>
+              <a:t>14.10.2022</a:t>
             </a:fld>
             <a:endParaRPr lang="ru-RU"/>
           </a:p>
@@ -2260,7 +2261,7 @@
           <a:p>
             <a:fld id="{DC4BD93D-3185-491E-B6C8-25388E42DC10}" type="datetimeFigureOut">
               <a:rPr lang="ru-RU" smtClean="0"/>
-              <a:t>13.09.2022</a:t>
+              <a:t>14.10.2022</a:t>
             </a:fld>
             <a:endParaRPr lang="ru-RU"/>
           </a:p>
@@ -2537,7 +2538,7 @@
           <a:p>
             <a:fld id="{DC4BD93D-3185-491E-B6C8-25388E42DC10}" type="datetimeFigureOut">
               <a:rPr lang="ru-RU" smtClean="0"/>
-              <a:t>13.09.2022</a:t>
+              <a:t>14.10.2022</a:t>
             </a:fld>
             <a:endParaRPr lang="ru-RU"/>
           </a:p>
@@ -2790,7 +2791,7 @@
           <a:p>
             <a:fld id="{DC4BD93D-3185-491E-B6C8-25388E42DC10}" type="datetimeFigureOut">
               <a:rPr lang="ru-RU" smtClean="0"/>
-              <a:t>13.09.2022</a:t>
+              <a:t>14.10.2022</a:t>
             </a:fld>
             <a:endParaRPr lang="ru-RU"/>
           </a:p>
@@ -3003,7 +3004,7 @@
           <a:p>
             <a:fld id="{DC4BD93D-3185-491E-B6C8-25388E42DC10}" type="datetimeFigureOut">
               <a:rPr lang="ru-RU" smtClean="0"/>
-              <a:t>13.09.2022</a:t>
+              <a:t>14.10.2022</a:t>
             </a:fld>
             <a:endParaRPr lang="ru-RU"/>
           </a:p>
@@ -3695,6 +3696,60 @@
 </p:sld>
 </file>
 
+<file path=ppt/slides/slide4.xml><?xml version="1.0" encoding="utf-8"?>
+<p:sld xmlns:a="http://schemas.openxmlformats.org/drawingml/2006/main" xmlns:r="http://schemas.openxmlformats.org/officeDocument/2006/relationships" xmlns:p="http://schemas.openxmlformats.org/presentationml/2006/main">
+  <p:cSld>
+    <p:spTree>
+      <p:nvGrpSpPr>
+        <p:cNvPr id="1" name=""/>
+        <p:cNvGrpSpPr/>
+        <p:nvPr/>
+      </p:nvGrpSpPr>
+      <p:grpSpPr>
+        <a:xfrm>
+          <a:off x="0" y="0"/>
+          <a:ext cx="0" cy="0"/>
+          <a:chOff x="0" y="0"/>
+          <a:chExt cx="0" cy="0"/>
+        </a:xfrm>
+      </p:grpSpPr>
+      <p:pic>
+        <p:nvPicPr>
+          <p:cNvPr id="2" name="Рисунок 1"/>
+          <p:cNvPicPr>
+            <a:picLocks noChangeAspect="1"/>
+          </p:cNvPicPr>
+          <p:nvPr/>
+        </p:nvPicPr>
+        <p:blipFill>
+          <a:blip r:embed="rId2"/>
+          <a:stretch>
+            <a:fillRect/>
+          </a:stretch>
+        </p:blipFill>
+        <p:spPr>
+          <a:xfrm>
+            <a:off x="0" y="0"/>
+            <a:ext cx="12192000" cy="6854653"/>
+          </a:xfrm>
+          <a:prstGeom prst="rect">
+            <a:avLst/>
+          </a:prstGeom>
+        </p:spPr>
+      </p:pic>
+    </p:spTree>
+    <p:extLst>
+      <p:ext uri="{BB962C8B-B14F-4D97-AF65-F5344CB8AC3E}">
+        <p14:creationId xmlns:p14="http://schemas.microsoft.com/office/powerpoint/2010/main" val="2163616885"/>
+      </p:ext>
+    </p:extLst>
+  </p:cSld>
+  <p:clrMapOvr>
+    <a:masterClrMapping/>
+  </p:clrMapOvr>
+</p:sld>
+</file>
+
 <file path=ppt/theme/theme1.xml><?xml version="1.0" encoding="utf-8"?>
 <a:theme xmlns:a="http://schemas.openxmlformats.org/drawingml/2006/main" name="Тема Office">
   <a:themeElements>

</xml_diff>